<commit_message>
update for GRDevDay (March 2015)
</commit_message>
<xml_diff>
--- a/The Secrets of LINQ.pptx
+++ b/The Secrets of LINQ.pptx
@@ -5,7 +5,7 @@
     <p:sldMasterId id="2147483660" r:id="rId1"/>
   </p:sldMasterIdLst>
   <p:notesMasterIdLst>
-    <p:notesMasterId r:id="rId33"/>
+    <p:notesMasterId r:id="rId30"/>
   </p:notesMasterIdLst>
   <p:sldIdLst>
     <p:sldId id="262" r:id="rId2"/>
@@ -28,17 +28,14 @@
     <p:sldId id="304" r:id="rId19"/>
     <p:sldId id="293" r:id="rId20"/>
     <p:sldId id="276" r:id="rId21"/>
-    <p:sldId id="296" r:id="rId22"/>
-    <p:sldId id="256" r:id="rId23"/>
-    <p:sldId id="286" r:id="rId24"/>
-    <p:sldId id="257" r:id="rId25"/>
-    <p:sldId id="258" r:id="rId26"/>
-    <p:sldId id="259" r:id="rId27"/>
-    <p:sldId id="284" r:id="rId28"/>
-    <p:sldId id="282" r:id="rId29"/>
-    <p:sldId id="280" r:id="rId30"/>
-    <p:sldId id="279" r:id="rId31"/>
-    <p:sldId id="305" r:id="rId32"/>
+    <p:sldId id="257" r:id="rId22"/>
+    <p:sldId id="258" r:id="rId23"/>
+    <p:sldId id="259" r:id="rId24"/>
+    <p:sldId id="284" r:id="rId25"/>
+    <p:sldId id="282" r:id="rId26"/>
+    <p:sldId id="280" r:id="rId27"/>
+    <p:sldId id="279" r:id="rId28"/>
+    <p:sldId id="305" r:id="rId29"/>
   </p:sldIdLst>
   <p:sldSz cx="12192000" cy="6858000"/>
   <p:notesSz cx="6858000" cy="9144000"/>
@@ -227,7 +224,7 @@
           <a:p>
             <a:fld id="{2B45B597-923B-4730-A722-02F657477DB7}" type="datetimeFigureOut">
               <a:rPr lang="en-US" smtClean="0"/>
-              <a:t>5/31/2014</a:t>
+              <a:t>3/21/2015</a:t>
             </a:fld>
             <a:endParaRPr lang="en-US"/>
           </a:p>
@@ -1373,7 +1370,7 @@
           <a:p>
             <a:fld id="{8ECED3F7-F610-466C-BDF4-3183BAA439F6}" type="datetimeFigureOut">
               <a:rPr lang="en-US" smtClean="0"/>
-              <a:t>5/31/2014</a:t>
+              <a:t>3/21/2015</a:t>
             </a:fld>
             <a:endParaRPr lang="en-US"/>
           </a:p>
@@ -1669,7 +1666,7 @@
           <a:p>
             <a:fld id="{8ECED3F7-F610-466C-BDF4-3183BAA439F6}" type="datetimeFigureOut">
               <a:rPr lang="en-US" smtClean="0"/>
-              <a:t>5/31/2014</a:t>
+              <a:t>3/21/2015</a:t>
             </a:fld>
             <a:endParaRPr lang="en-US"/>
           </a:p>
@@ -1917,7 +1914,7 @@
           <a:p>
             <a:fld id="{8ECED3F7-F610-466C-BDF4-3183BAA439F6}" type="datetimeFigureOut">
               <a:rPr lang="en-US" smtClean="0"/>
-              <a:t>5/31/2014</a:t>
+              <a:t>3/21/2015</a:t>
             </a:fld>
             <a:endParaRPr lang="en-US"/>
           </a:p>
@@ -2457,7 +2454,7 @@
           <a:p>
             <a:fld id="{8ECED3F7-F610-466C-BDF4-3183BAA439F6}" type="datetimeFigureOut">
               <a:rPr lang="en-US" smtClean="0"/>
-              <a:t>5/31/2014</a:t>
+              <a:t>3/21/2015</a:t>
             </a:fld>
             <a:endParaRPr lang="en-US"/>
           </a:p>
@@ -2705,7 +2702,7 @@
           <a:p>
             <a:fld id="{8ECED3F7-F610-466C-BDF4-3183BAA439F6}" type="datetimeFigureOut">
               <a:rPr lang="en-US" smtClean="0"/>
-              <a:t>5/31/2014</a:t>
+              <a:t>3/21/2015</a:t>
             </a:fld>
             <a:endParaRPr lang="en-US"/>
           </a:p>
@@ -3237,7 +3234,7 @@
           <a:p>
             <a:fld id="{8ECED3F7-F610-466C-BDF4-3183BAA439F6}" type="datetimeFigureOut">
               <a:rPr lang="en-US" smtClean="0"/>
-              <a:t>5/31/2014</a:t>
+              <a:t>3/21/2015</a:t>
             </a:fld>
             <a:endParaRPr lang="en-US"/>
           </a:p>
@@ -3534,7 +3531,7 @@
           <a:p>
             <a:fld id="{8ECED3F7-F610-466C-BDF4-3183BAA439F6}" type="datetimeFigureOut">
               <a:rPr lang="en-US" smtClean="0"/>
-              <a:t>5/31/2014</a:t>
+              <a:t>3/21/2015</a:t>
             </a:fld>
             <a:endParaRPr lang="en-US"/>
           </a:p>
@@ -3708,7 +3705,7 @@
           <a:p>
             <a:fld id="{8ECED3F7-F610-466C-BDF4-3183BAA439F6}" type="datetimeFigureOut">
               <a:rPr lang="en-US" smtClean="0"/>
-              <a:t>5/31/2014</a:t>
+              <a:t>3/21/2015</a:t>
             </a:fld>
             <a:endParaRPr lang="en-US"/>
           </a:p>
@@ -3888,7 +3885,7 @@
           <a:p>
             <a:fld id="{8ECED3F7-F610-466C-BDF4-3183BAA439F6}" type="datetimeFigureOut">
               <a:rPr lang="en-US" smtClean="0"/>
-              <a:t>5/31/2014</a:t>
+              <a:t>3/21/2015</a:t>
             </a:fld>
             <a:endParaRPr lang="en-US"/>
           </a:p>
@@ -4058,7 +4055,7 @@
           <a:p>
             <a:fld id="{8ECED3F7-F610-466C-BDF4-3183BAA439F6}" type="datetimeFigureOut">
               <a:rPr lang="en-US" smtClean="0"/>
-              <a:t>5/31/2014</a:t>
+              <a:t>3/21/2015</a:t>
             </a:fld>
             <a:endParaRPr lang="en-US"/>
           </a:p>
@@ -4309,7 +4306,7 @@
           <a:p>
             <a:fld id="{8ECED3F7-F610-466C-BDF4-3183BAA439F6}" type="datetimeFigureOut">
               <a:rPr lang="en-US" smtClean="0"/>
-              <a:t>5/31/2014</a:t>
+              <a:t>3/21/2015</a:t>
             </a:fld>
             <a:endParaRPr lang="en-US"/>
           </a:p>
@@ -4606,7 +4603,7 @@
           <a:p>
             <a:fld id="{8ECED3F7-F610-466C-BDF4-3183BAA439F6}" type="datetimeFigureOut">
               <a:rPr lang="en-US" smtClean="0"/>
-              <a:t>5/31/2014</a:t>
+              <a:t>3/21/2015</a:t>
             </a:fld>
             <a:endParaRPr lang="en-US"/>
           </a:p>
@@ -5048,7 +5045,7 @@
           <a:p>
             <a:fld id="{8ECED3F7-F610-466C-BDF4-3183BAA439F6}" type="datetimeFigureOut">
               <a:rPr lang="en-US" smtClean="0"/>
-              <a:t>5/31/2014</a:t>
+              <a:t>3/21/2015</a:t>
             </a:fld>
             <a:endParaRPr lang="en-US"/>
           </a:p>
@@ -5166,7 +5163,7 @@
           <a:p>
             <a:fld id="{8ECED3F7-F610-466C-BDF4-3183BAA439F6}" type="datetimeFigureOut">
               <a:rPr lang="en-US" smtClean="0"/>
-              <a:t>5/31/2014</a:t>
+              <a:t>3/21/2015</a:t>
             </a:fld>
             <a:endParaRPr lang="en-US"/>
           </a:p>
@@ -5261,7 +5258,7 @@
           <a:p>
             <a:fld id="{8ECED3F7-F610-466C-BDF4-3183BAA439F6}" type="datetimeFigureOut">
               <a:rPr lang="en-US" smtClean="0"/>
-              <a:t>5/31/2014</a:t>
+              <a:t>3/21/2015</a:t>
             </a:fld>
             <a:endParaRPr lang="en-US"/>
           </a:p>
@@ -5544,7 +5541,7 @@
           <a:p>
             <a:fld id="{8ECED3F7-F610-466C-BDF4-3183BAA439F6}" type="datetimeFigureOut">
               <a:rPr lang="en-US" smtClean="0"/>
-              <a:t>5/31/2014</a:t>
+              <a:t>3/21/2015</a:t>
             </a:fld>
             <a:endParaRPr lang="en-US"/>
           </a:p>
@@ -5835,7 +5832,7 @@
           <a:p>
             <a:fld id="{8ECED3F7-F610-466C-BDF4-3183BAA439F6}" type="datetimeFigureOut">
               <a:rPr lang="en-US" smtClean="0"/>
-              <a:t>5/31/2014</a:t>
+              <a:t>3/21/2015</a:t>
             </a:fld>
             <a:endParaRPr lang="en-US"/>
           </a:p>
@@ -6365,7 +6362,7 @@
           <a:p>
             <a:fld id="{8ECED3F7-F610-466C-BDF4-3183BAA439F6}" type="datetimeFigureOut">
               <a:rPr lang="en-US" smtClean="0"/>
-              <a:t>5/31/2014</a:t>
+              <a:t>3/21/2015</a:t>
             </a:fld>
             <a:endParaRPr lang="en-US"/>
           </a:p>
@@ -10529,7 +10526,15 @@
           <a:p>
             <a:r>
               <a:rPr lang="en-US" dirty="0"/>
-              <a:t>Professional Developer for 5+ years</a:t>
+              <a:t>Professional Developer for </a:t>
+            </a:r>
+            <a:r>
+              <a:rPr lang="en-US" dirty="0" smtClean="0"/>
+              <a:t>6+ </a:t>
+            </a:r>
+            <a:r>
+              <a:rPr lang="en-US" dirty="0"/>
+              <a:t>years</a:t>
             </a:r>
           </a:p>
           <a:p>
@@ -10830,646 +10835,6 @@
 </file>
 
 <file path=ppt/slides/slide21.xml><?xml version="1.0" encoding="utf-8"?>
-<p:sld xmlns:a="http://schemas.openxmlformats.org/drawingml/2006/main" xmlns:r="http://schemas.openxmlformats.org/officeDocument/2006/relationships" xmlns:p="http://schemas.openxmlformats.org/presentationml/2006/main">
-  <p:cSld>
-    <p:spTree>
-      <p:nvGrpSpPr>
-        <p:cNvPr id="1" name=""/>
-        <p:cNvGrpSpPr/>
-        <p:nvPr/>
-      </p:nvGrpSpPr>
-      <p:grpSpPr>
-        <a:xfrm>
-          <a:off x="0" y="0"/>
-          <a:ext cx="0" cy="0"/>
-          <a:chOff x="0" y="0"/>
-          <a:chExt cx="0" cy="0"/>
-        </a:xfrm>
-      </p:grpSpPr>
-      <p:sp>
-        <p:nvSpPr>
-          <p:cNvPr id="2" name="Title 1"/>
-          <p:cNvSpPr>
-            <a:spLocks noGrp="1"/>
-          </p:cNvSpPr>
-          <p:nvPr>
-            <p:ph type="title"/>
-          </p:nvPr>
-        </p:nvSpPr>
-        <p:spPr/>
-        <p:txBody>
-          <a:bodyPr/>
-          <a:lstStyle/>
-          <a:p>
-            <a:r>
-              <a:rPr lang="en-US" dirty="0" smtClean="0"/>
-              <a:t>Trees</a:t>
-            </a:r>
-            <a:endParaRPr lang="en-US" dirty="0"/>
-          </a:p>
-        </p:txBody>
-      </p:sp>
-      <p:sp>
-        <p:nvSpPr>
-          <p:cNvPr id="3" name="Content Placeholder 2"/>
-          <p:cNvSpPr>
-            <a:spLocks noGrp="1"/>
-          </p:cNvSpPr>
-          <p:nvPr>
-            <p:ph idx="1"/>
-          </p:nvPr>
-        </p:nvSpPr>
-        <p:spPr/>
-        <p:txBody>
-          <a:bodyPr>
-            <a:normAutofit fontScale="92500" lnSpcReduction="20000"/>
-          </a:bodyPr>
-          <a:lstStyle/>
-          <a:p>
-            <a:r>
-              <a:rPr lang="en-US" dirty="0" smtClean="0"/>
-              <a:t>Hierarchical data structures</a:t>
-            </a:r>
-          </a:p>
-          <a:p>
-            <a:r>
-              <a:rPr lang="en-US" dirty="0" smtClean="0"/>
-              <a:t>Terms</a:t>
-            </a:r>
-          </a:p>
-          <a:p>
-            <a:pPr lvl="1"/>
-            <a:r>
-              <a:rPr lang="en-US" dirty="0" smtClean="0"/>
-              <a:t>Node – object in the tree</a:t>
-            </a:r>
-          </a:p>
-          <a:p>
-            <a:pPr lvl="1"/>
-            <a:r>
-              <a:rPr lang="en-US" dirty="0" smtClean="0"/>
-              <a:t>Edge – connection between two nodes</a:t>
-            </a:r>
-          </a:p>
-          <a:p>
-            <a:pPr lvl="1"/>
-            <a:r>
-              <a:rPr lang="en-US" dirty="0" smtClean="0"/>
-              <a:t>Root – starting node of the tree</a:t>
-            </a:r>
-          </a:p>
-          <a:p>
-            <a:pPr lvl="1"/>
-            <a:r>
-              <a:rPr lang="en-US" dirty="0" smtClean="0"/>
-              <a:t>Parent – a node with children</a:t>
-            </a:r>
-          </a:p>
-          <a:p>
-            <a:pPr lvl="1"/>
-            <a:r>
-              <a:rPr lang="en-US" dirty="0" smtClean="0"/>
-              <a:t>Child – a node underneath a parent node</a:t>
-            </a:r>
-          </a:p>
-          <a:p>
-            <a:pPr lvl="1"/>
-            <a:r>
-              <a:rPr lang="en-US" dirty="0" smtClean="0"/>
-              <a:t>Leaf Node – a node with no children</a:t>
-            </a:r>
-            <a:endParaRPr lang="en-US" dirty="0"/>
-          </a:p>
-        </p:txBody>
-      </p:sp>
-      <p:pic>
-        <p:nvPicPr>
-          <p:cNvPr id="5" name="Picture 4"/>
-          <p:cNvPicPr>
-            <a:picLocks noChangeAspect="1"/>
-          </p:cNvPicPr>
-          <p:nvPr/>
-        </p:nvPicPr>
-        <p:blipFill>
-          <a:blip r:embed="rId2"/>
-          <a:stretch>
-            <a:fillRect/>
-          </a:stretch>
-        </p:blipFill>
-        <p:spPr>
-          <a:xfrm>
-            <a:off x="6904615" y="3501190"/>
-            <a:ext cx="5096390" cy="3112166"/>
-          </a:xfrm>
-          <a:prstGeom prst="rect">
-            <a:avLst/>
-          </a:prstGeom>
-        </p:spPr>
-      </p:pic>
-    </p:spTree>
-    <p:extLst>
-      <p:ext uri="{BB962C8B-B14F-4D97-AF65-F5344CB8AC3E}">
-        <p14:creationId xmlns:p14="http://schemas.microsoft.com/office/powerpoint/2010/main" val="3654972280"/>
-      </p:ext>
-    </p:extLst>
-  </p:cSld>
-  <p:clrMapOvr>
-    <a:masterClrMapping/>
-  </p:clrMapOvr>
-  <p:timing>
-    <p:tnLst>
-      <p:par>
-        <p:cTn id="1" dur="indefinite" restart="never" nodeType="tmRoot">
-          <p:childTnLst>
-            <p:seq concurrent="1" nextAc="seek">
-              <p:cTn id="2" dur="indefinite" nodeType="mainSeq">
-                <p:childTnLst>
-                  <p:par>
-                    <p:cTn id="3" fill="hold">
-                      <p:stCondLst>
-                        <p:cond delay="indefinite"/>
-                      </p:stCondLst>
-                      <p:childTnLst>
-                        <p:par>
-                          <p:cTn id="4" fill="hold">
-                            <p:stCondLst>
-                              <p:cond delay="0"/>
-                            </p:stCondLst>
-                            <p:childTnLst>
-                              <p:par>
-                                <p:cTn id="5" presetID="1" presetClass="entr" presetSubtype="0" fill="hold" nodeType="clickEffect">
-                                  <p:stCondLst>
-                                    <p:cond delay="0"/>
-                                  </p:stCondLst>
-                                  <p:childTnLst>
-                                    <p:set>
-                                      <p:cBhvr>
-                                        <p:cTn id="6" dur="1" fill="hold">
-                                          <p:stCondLst>
-                                            <p:cond delay="0"/>
-                                          </p:stCondLst>
-                                        </p:cTn>
-                                        <p:tgtEl>
-                                          <p:spTgt spid="3">
-                                            <p:txEl>
-                                              <p:pRg st="0" end="0"/>
-                                            </p:txEl>
-                                          </p:spTgt>
-                                        </p:tgtEl>
-                                        <p:attrNameLst>
-                                          <p:attrName>style.visibility</p:attrName>
-                                        </p:attrNameLst>
-                                      </p:cBhvr>
-                                      <p:to>
-                                        <p:strVal val="visible"/>
-                                      </p:to>
-                                    </p:set>
-                                  </p:childTnLst>
-                                </p:cTn>
-                              </p:par>
-                            </p:childTnLst>
-                          </p:cTn>
-                        </p:par>
-                      </p:childTnLst>
-                    </p:cTn>
-                  </p:par>
-                  <p:par>
-                    <p:cTn id="7" fill="hold">
-                      <p:stCondLst>
-                        <p:cond delay="indefinite"/>
-                      </p:stCondLst>
-                      <p:childTnLst>
-                        <p:par>
-                          <p:cTn id="8" fill="hold">
-                            <p:stCondLst>
-                              <p:cond delay="0"/>
-                            </p:stCondLst>
-                            <p:childTnLst>
-                              <p:par>
-                                <p:cTn id="9" presetID="1" presetClass="entr" presetSubtype="0" fill="hold" nodeType="clickEffect">
-                                  <p:stCondLst>
-                                    <p:cond delay="0"/>
-                                  </p:stCondLst>
-                                  <p:childTnLst>
-                                    <p:set>
-                                      <p:cBhvr>
-                                        <p:cTn id="10" dur="1" fill="hold">
-                                          <p:stCondLst>
-                                            <p:cond delay="0"/>
-                                          </p:stCondLst>
-                                        </p:cTn>
-                                        <p:tgtEl>
-                                          <p:spTgt spid="3">
-                                            <p:txEl>
-                                              <p:pRg st="1" end="1"/>
-                                            </p:txEl>
-                                          </p:spTgt>
-                                        </p:tgtEl>
-                                        <p:attrNameLst>
-                                          <p:attrName>style.visibility</p:attrName>
-                                        </p:attrNameLst>
-                                      </p:cBhvr>
-                                      <p:to>
-                                        <p:strVal val="visible"/>
-                                      </p:to>
-                                    </p:set>
-                                  </p:childTnLst>
-                                </p:cTn>
-                              </p:par>
-                              <p:par>
-                                <p:cTn id="11" presetID="1" presetClass="entr" presetSubtype="0" fill="hold" nodeType="withEffect">
-                                  <p:stCondLst>
-                                    <p:cond delay="0"/>
-                                  </p:stCondLst>
-                                  <p:childTnLst>
-                                    <p:set>
-                                      <p:cBhvr>
-                                        <p:cTn id="12" dur="1" fill="hold">
-                                          <p:stCondLst>
-                                            <p:cond delay="0"/>
-                                          </p:stCondLst>
-                                        </p:cTn>
-                                        <p:tgtEl>
-                                          <p:spTgt spid="3">
-                                            <p:txEl>
-                                              <p:pRg st="2" end="2"/>
-                                            </p:txEl>
-                                          </p:spTgt>
-                                        </p:tgtEl>
-                                        <p:attrNameLst>
-                                          <p:attrName>style.visibility</p:attrName>
-                                        </p:attrNameLst>
-                                      </p:cBhvr>
-                                      <p:to>
-                                        <p:strVal val="visible"/>
-                                      </p:to>
-                                    </p:set>
-                                  </p:childTnLst>
-                                </p:cTn>
-                              </p:par>
-                              <p:par>
-                                <p:cTn id="13" presetID="1" presetClass="entr" presetSubtype="0" fill="hold" nodeType="withEffect">
-                                  <p:stCondLst>
-                                    <p:cond delay="0"/>
-                                  </p:stCondLst>
-                                  <p:childTnLst>
-                                    <p:set>
-                                      <p:cBhvr>
-                                        <p:cTn id="14" dur="1" fill="hold">
-                                          <p:stCondLst>
-                                            <p:cond delay="0"/>
-                                          </p:stCondLst>
-                                        </p:cTn>
-                                        <p:tgtEl>
-                                          <p:spTgt spid="3">
-                                            <p:txEl>
-                                              <p:pRg st="3" end="3"/>
-                                            </p:txEl>
-                                          </p:spTgt>
-                                        </p:tgtEl>
-                                        <p:attrNameLst>
-                                          <p:attrName>style.visibility</p:attrName>
-                                        </p:attrNameLst>
-                                      </p:cBhvr>
-                                      <p:to>
-                                        <p:strVal val="visible"/>
-                                      </p:to>
-                                    </p:set>
-                                  </p:childTnLst>
-                                </p:cTn>
-                              </p:par>
-                              <p:par>
-                                <p:cTn id="15" presetID="1" presetClass="entr" presetSubtype="0" fill="hold" nodeType="withEffect">
-                                  <p:stCondLst>
-                                    <p:cond delay="0"/>
-                                  </p:stCondLst>
-                                  <p:childTnLst>
-                                    <p:set>
-                                      <p:cBhvr>
-                                        <p:cTn id="16" dur="1" fill="hold">
-                                          <p:stCondLst>
-                                            <p:cond delay="0"/>
-                                          </p:stCondLst>
-                                        </p:cTn>
-                                        <p:tgtEl>
-                                          <p:spTgt spid="3">
-                                            <p:txEl>
-                                              <p:pRg st="4" end="4"/>
-                                            </p:txEl>
-                                          </p:spTgt>
-                                        </p:tgtEl>
-                                        <p:attrNameLst>
-                                          <p:attrName>style.visibility</p:attrName>
-                                        </p:attrNameLst>
-                                      </p:cBhvr>
-                                      <p:to>
-                                        <p:strVal val="visible"/>
-                                      </p:to>
-                                    </p:set>
-                                  </p:childTnLst>
-                                </p:cTn>
-                              </p:par>
-                              <p:par>
-                                <p:cTn id="17" presetID="1" presetClass="entr" presetSubtype="0" fill="hold" nodeType="withEffect">
-                                  <p:stCondLst>
-                                    <p:cond delay="0"/>
-                                  </p:stCondLst>
-                                  <p:childTnLst>
-                                    <p:set>
-                                      <p:cBhvr>
-                                        <p:cTn id="18" dur="1" fill="hold">
-                                          <p:stCondLst>
-                                            <p:cond delay="0"/>
-                                          </p:stCondLst>
-                                        </p:cTn>
-                                        <p:tgtEl>
-                                          <p:spTgt spid="3">
-                                            <p:txEl>
-                                              <p:pRg st="5" end="5"/>
-                                            </p:txEl>
-                                          </p:spTgt>
-                                        </p:tgtEl>
-                                        <p:attrNameLst>
-                                          <p:attrName>style.visibility</p:attrName>
-                                        </p:attrNameLst>
-                                      </p:cBhvr>
-                                      <p:to>
-                                        <p:strVal val="visible"/>
-                                      </p:to>
-                                    </p:set>
-                                  </p:childTnLst>
-                                </p:cTn>
-                              </p:par>
-                              <p:par>
-                                <p:cTn id="19" presetID="1" presetClass="entr" presetSubtype="0" fill="hold" nodeType="withEffect">
-                                  <p:stCondLst>
-                                    <p:cond delay="0"/>
-                                  </p:stCondLst>
-                                  <p:childTnLst>
-                                    <p:set>
-                                      <p:cBhvr>
-                                        <p:cTn id="20" dur="1" fill="hold">
-                                          <p:stCondLst>
-                                            <p:cond delay="0"/>
-                                          </p:stCondLst>
-                                        </p:cTn>
-                                        <p:tgtEl>
-                                          <p:spTgt spid="3">
-                                            <p:txEl>
-                                              <p:pRg st="6" end="6"/>
-                                            </p:txEl>
-                                          </p:spTgt>
-                                        </p:tgtEl>
-                                        <p:attrNameLst>
-                                          <p:attrName>style.visibility</p:attrName>
-                                        </p:attrNameLst>
-                                      </p:cBhvr>
-                                      <p:to>
-                                        <p:strVal val="visible"/>
-                                      </p:to>
-                                    </p:set>
-                                  </p:childTnLst>
-                                </p:cTn>
-                              </p:par>
-                              <p:par>
-                                <p:cTn id="21" presetID="1" presetClass="entr" presetSubtype="0" fill="hold" nodeType="withEffect">
-                                  <p:stCondLst>
-                                    <p:cond delay="0"/>
-                                  </p:stCondLst>
-                                  <p:childTnLst>
-                                    <p:set>
-                                      <p:cBhvr>
-                                        <p:cTn id="22" dur="1" fill="hold">
-                                          <p:stCondLst>
-                                            <p:cond delay="0"/>
-                                          </p:stCondLst>
-                                        </p:cTn>
-                                        <p:tgtEl>
-                                          <p:spTgt spid="3">
-                                            <p:txEl>
-                                              <p:pRg st="7" end="7"/>
-                                            </p:txEl>
-                                          </p:spTgt>
-                                        </p:tgtEl>
-                                        <p:attrNameLst>
-                                          <p:attrName>style.visibility</p:attrName>
-                                        </p:attrNameLst>
-                                      </p:cBhvr>
-                                      <p:to>
-                                        <p:strVal val="visible"/>
-                                      </p:to>
-                                    </p:set>
-                                  </p:childTnLst>
-                                </p:cTn>
-                              </p:par>
-                              <p:par>
-                                <p:cTn id="23" presetID="1" presetClass="entr" presetSubtype="0" fill="hold" nodeType="withEffect">
-                                  <p:stCondLst>
-                                    <p:cond delay="0"/>
-                                  </p:stCondLst>
-                                  <p:childTnLst>
-                                    <p:set>
-                                      <p:cBhvr>
-                                        <p:cTn id="24" dur="1" fill="hold">
-                                          <p:stCondLst>
-                                            <p:cond delay="0"/>
-                                          </p:stCondLst>
-                                        </p:cTn>
-                                        <p:tgtEl>
-                                          <p:spTgt spid="5"/>
-                                        </p:tgtEl>
-                                        <p:attrNameLst>
-                                          <p:attrName>style.visibility</p:attrName>
-                                        </p:attrNameLst>
-                                      </p:cBhvr>
-                                      <p:to>
-                                        <p:strVal val="visible"/>
-                                      </p:to>
-                                    </p:set>
-                                  </p:childTnLst>
-                                </p:cTn>
-                              </p:par>
-                            </p:childTnLst>
-                          </p:cTn>
-                        </p:par>
-                      </p:childTnLst>
-                    </p:cTn>
-                  </p:par>
-                </p:childTnLst>
-              </p:cTn>
-              <p:prevCondLst>
-                <p:cond evt="onPrev" delay="0">
-                  <p:tgtEl>
-                    <p:sldTgt/>
-                  </p:tgtEl>
-                </p:cond>
-              </p:prevCondLst>
-              <p:nextCondLst>
-                <p:cond evt="onNext" delay="0">
-                  <p:tgtEl>
-                    <p:sldTgt/>
-                  </p:tgtEl>
-                </p:cond>
-              </p:nextCondLst>
-            </p:seq>
-          </p:childTnLst>
-        </p:cTn>
-      </p:par>
-    </p:tnLst>
-  </p:timing>
-</p:sld>
-</file>
-
-<file path=ppt/slides/slide22.xml><?xml version="1.0" encoding="utf-8"?>
-<p:sld xmlns:a="http://schemas.openxmlformats.org/drawingml/2006/main" xmlns:r="http://schemas.openxmlformats.org/officeDocument/2006/relationships" xmlns:p="http://schemas.openxmlformats.org/presentationml/2006/main">
-  <p:cSld>
-    <p:spTree>
-      <p:nvGrpSpPr>
-        <p:cNvPr id="1" name=""/>
-        <p:cNvGrpSpPr/>
-        <p:nvPr/>
-      </p:nvGrpSpPr>
-      <p:grpSpPr>
-        <a:xfrm>
-          <a:off x="0" y="0"/>
-          <a:ext cx="0" cy="0"/>
-          <a:chOff x="0" y="0"/>
-          <a:chExt cx="0" cy="0"/>
-        </a:xfrm>
-      </p:grpSpPr>
-      <p:sp>
-        <p:nvSpPr>
-          <p:cNvPr id="4" name="Title 3"/>
-          <p:cNvSpPr>
-            <a:spLocks noGrp="1"/>
-          </p:cNvSpPr>
-          <p:nvPr>
-            <p:ph type="title"/>
-          </p:nvPr>
-        </p:nvSpPr>
-        <p:spPr/>
-        <p:txBody>
-          <a:bodyPr/>
-          <a:lstStyle/>
-          <a:p>
-            <a:r>
-              <a:rPr lang="en-US" dirty="0" smtClean="0"/>
-              <a:t>Object Graph</a:t>
-            </a:r>
-            <a:endParaRPr lang="en-US" dirty="0"/>
-          </a:p>
-        </p:txBody>
-      </p:sp>
-      <p:pic>
-        <p:nvPicPr>
-          <p:cNvPr id="5" name="Picture 4"/>
-          <p:cNvPicPr>
-            <a:picLocks noChangeAspect="1"/>
-          </p:cNvPicPr>
-          <p:nvPr/>
-        </p:nvPicPr>
-        <p:blipFill>
-          <a:blip r:embed="rId2"/>
-          <a:stretch>
-            <a:fillRect/>
-          </a:stretch>
-        </p:blipFill>
-        <p:spPr>
-          <a:xfrm>
-            <a:off x="3541919" y="2021743"/>
-            <a:ext cx="5903494" cy="4595188"/>
-          </a:xfrm>
-          <a:prstGeom prst="rect">
-            <a:avLst/>
-          </a:prstGeom>
-        </p:spPr>
-      </p:pic>
-    </p:spTree>
-    <p:extLst>
-      <p:ext uri="{BB962C8B-B14F-4D97-AF65-F5344CB8AC3E}">
-        <p14:creationId xmlns:p14="http://schemas.microsoft.com/office/powerpoint/2010/main" val="1601161016"/>
-      </p:ext>
-    </p:extLst>
-  </p:cSld>
-  <p:clrMapOvr>
-    <a:masterClrMapping/>
-  </p:clrMapOvr>
-  <p:timing>
-    <p:tnLst>
-      <p:par>
-        <p:cTn id="1" dur="indefinite" restart="never" nodeType="tmRoot"/>
-      </p:par>
-    </p:tnLst>
-  </p:timing>
-</p:sld>
-</file>
-
-<file path=ppt/slides/slide23.xml><?xml version="1.0" encoding="utf-8"?>
-<p:sld xmlns:a="http://schemas.openxmlformats.org/drawingml/2006/main" xmlns:r="http://schemas.openxmlformats.org/officeDocument/2006/relationships" xmlns:p="http://schemas.openxmlformats.org/presentationml/2006/main">
-  <p:cSld>
-    <p:spTree>
-      <p:nvGrpSpPr>
-        <p:cNvPr id="1" name=""/>
-        <p:cNvGrpSpPr/>
-        <p:nvPr/>
-      </p:nvGrpSpPr>
-      <p:grpSpPr>
-        <a:xfrm>
-          <a:off x="0" y="0"/>
-          <a:ext cx="0" cy="0"/>
-          <a:chOff x="0" y="0"/>
-          <a:chExt cx="0" cy="0"/>
-        </a:xfrm>
-      </p:grpSpPr>
-      <p:sp>
-        <p:nvSpPr>
-          <p:cNvPr id="3" name="Content Placeholder 2"/>
-          <p:cNvSpPr>
-            <a:spLocks noGrp="1"/>
-          </p:cNvSpPr>
-          <p:nvPr>
-            <p:ph idx="1"/>
-          </p:nvPr>
-        </p:nvSpPr>
-        <p:spPr/>
-        <p:txBody>
-          <a:bodyPr>
-            <a:normAutofit/>
-          </a:bodyPr>
-          <a:lstStyle/>
-          <a:p>
-            <a:pPr marL="0" indent="0">
-              <a:buNone/>
-            </a:pPr>
-            <a:r>
-              <a:rPr lang="en-US" sz="8000" dirty="0" smtClean="0"/>
-              <a:t>DEMO</a:t>
-            </a:r>
-            <a:endParaRPr lang="en-US" sz="8000" dirty="0"/>
-          </a:p>
-        </p:txBody>
-      </p:sp>
-    </p:spTree>
-    <p:extLst>
-      <p:ext uri="{BB962C8B-B14F-4D97-AF65-F5344CB8AC3E}">
-        <p14:creationId xmlns:p14="http://schemas.microsoft.com/office/powerpoint/2010/main" val="2944585282"/>
-      </p:ext>
-    </p:extLst>
-  </p:cSld>
-  <p:clrMapOvr>
-    <a:masterClrMapping/>
-  </p:clrMapOvr>
-  <p:timing>
-    <p:tnLst>
-      <p:par>
-        <p:cTn id="1" dur="indefinite" restart="never" nodeType="tmRoot"/>
-      </p:par>
-    </p:tnLst>
-  </p:timing>
-</p:sld>
-</file>
-
-<file path=ppt/slides/slide24.xml><?xml version="1.0" encoding="utf-8"?>
 <p:sld xmlns:a="http://schemas.openxmlformats.org/drawingml/2006/main" xmlns:r="http://schemas.openxmlformats.org/officeDocument/2006/relationships" xmlns:p="http://schemas.openxmlformats.org/presentationml/2006/main">
   <p:cSld>
     <p:spTree>
@@ -11869,7 +11234,7 @@
 </p:sld>
 </file>
 
-<file path=ppt/slides/slide25.xml><?xml version="1.0" encoding="utf-8"?>
+<file path=ppt/slides/slide22.xml><?xml version="1.0" encoding="utf-8"?>
 <p:sld xmlns:a="http://schemas.openxmlformats.org/drawingml/2006/main" xmlns:r="http://schemas.openxmlformats.org/officeDocument/2006/relationships" xmlns:p="http://schemas.openxmlformats.org/presentationml/2006/main">
   <p:cSld>
     <p:spTree>
@@ -12250,7 +11615,7 @@
 </p:sld>
 </file>
 
-<file path=ppt/slides/slide26.xml><?xml version="1.0" encoding="utf-8"?>
+<file path=ppt/slides/slide23.xml><?xml version="1.0" encoding="utf-8"?>
 <p:sld xmlns:a="http://schemas.openxmlformats.org/drawingml/2006/main" xmlns:r="http://schemas.openxmlformats.org/officeDocument/2006/relationships" xmlns:p="http://schemas.openxmlformats.org/presentationml/2006/main">
   <p:cSld>
     <p:spTree>
@@ -12340,7 +11705,7 @@
 </p:sld>
 </file>
 
-<file path=ppt/slides/slide27.xml><?xml version="1.0" encoding="utf-8"?>
+<file path=ppt/slides/slide24.xml><?xml version="1.0" encoding="utf-8"?>
 <p:sld xmlns:a="http://schemas.openxmlformats.org/drawingml/2006/main" xmlns:r="http://schemas.openxmlformats.org/officeDocument/2006/relationships" xmlns:p="http://schemas.openxmlformats.org/presentationml/2006/main">
   <p:cSld>
     <p:spTree>
@@ -12405,7 +11770,7 @@
 </p:sld>
 </file>
 
-<file path=ppt/slides/slide28.xml><?xml version="1.0" encoding="utf-8"?>
+<file path=ppt/slides/slide25.xml><?xml version="1.0" encoding="utf-8"?>
 <p:sld xmlns:a="http://schemas.openxmlformats.org/drawingml/2006/main" xmlns:r="http://schemas.openxmlformats.org/officeDocument/2006/relationships" xmlns:p="http://schemas.openxmlformats.org/presentationml/2006/main">
   <p:cSld>
     <p:spTree>
@@ -12466,7 +11831,7 @@
 </p:sld>
 </file>
 
-<file path=ppt/slides/slide29.xml><?xml version="1.0" encoding="utf-8"?>
+<file path=ppt/slides/slide26.xml><?xml version="1.0" encoding="utf-8"?>
 <p:sld xmlns:a="http://schemas.openxmlformats.org/drawingml/2006/main" xmlns:r="http://schemas.openxmlformats.org/officeDocument/2006/relationships" xmlns:p="http://schemas.openxmlformats.org/presentationml/2006/main">
   <p:cSld>
     <p:spTree>
@@ -12690,200 +12055,7 @@
 </p:sld>
 </file>
 
-<file path=ppt/slides/slide3.xml><?xml version="1.0" encoding="utf-8"?>
-<p:sld xmlns:a="http://schemas.openxmlformats.org/drawingml/2006/main" xmlns:r="http://schemas.openxmlformats.org/officeDocument/2006/relationships" xmlns:p="http://schemas.openxmlformats.org/presentationml/2006/main">
-  <p:cSld>
-    <p:spTree>
-      <p:nvGrpSpPr>
-        <p:cNvPr id="1" name=""/>
-        <p:cNvGrpSpPr/>
-        <p:nvPr/>
-      </p:nvGrpSpPr>
-      <p:grpSpPr>
-        <a:xfrm>
-          <a:off x="0" y="0"/>
-          <a:ext cx="0" cy="0"/>
-          <a:chOff x="0" y="0"/>
-          <a:chExt cx="0" cy="0"/>
-        </a:xfrm>
-      </p:grpSpPr>
-      <p:sp>
-        <p:nvSpPr>
-          <p:cNvPr id="2" name="Title 1"/>
-          <p:cNvSpPr>
-            <a:spLocks noGrp="1"/>
-          </p:cNvSpPr>
-          <p:nvPr>
-            <p:ph type="title"/>
-          </p:nvPr>
-        </p:nvSpPr>
-        <p:spPr/>
-        <p:txBody>
-          <a:bodyPr/>
-          <a:lstStyle/>
-          <a:p>
-            <a:r>
-              <a:rPr lang="en-US" dirty="0" smtClean="0"/>
-              <a:t>Functional Programming</a:t>
-            </a:r>
-            <a:endParaRPr lang="en-US" dirty="0"/>
-          </a:p>
-        </p:txBody>
-      </p:sp>
-      <mc:AlternateContent xmlns:mc="http://schemas.openxmlformats.org/markup-compatibility/2006" xmlns:a14="http://schemas.microsoft.com/office/drawing/2010/main">
-        <mc:Choice Requires="a14">
-          <p:sp>
-            <p:nvSpPr>
-              <p:cNvPr id="3" name="Content Placeholder 2"/>
-              <p:cNvSpPr>
-                <a:spLocks noGrp="1"/>
-              </p:cNvSpPr>
-              <p:nvPr>
-                <p:ph idx="1"/>
-              </p:nvPr>
-            </p:nvSpPr>
-            <p:spPr/>
-            <p:txBody>
-              <a:bodyPr/>
-              <a:lstStyle/>
-              <a:p>
-                <a:r>
-                  <a:rPr lang="en-US" dirty="0" smtClean="0"/>
-                  <a:t>Another Programming paradigm (OOP, procedural, etc.)</a:t>
-                </a:r>
-              </a:p>
-              <a:p>
-                <a:r>
-                  <a:rPr lang="en-US" dirty="0" smtClean="0"/>
-                  <a:t>Centered around the mathematical concept of a function</a:t>
-                </a:r>
-              </a:p>
-              <a:p>
-                <a:pPr lvl="1"/>
-                <a:r>
-                  <a:rPr lang="en-US" dirty="0" smtClean="0"/>
-                  <a:t>Immutable and idempotent</a:t>
-                </a:r>
-              </a:p>
-              <a:p>
-                <a14:m>
-                  <m:oMath xmlns:m="http://schemas.openxmlformats.org/officeDocument/2006/math">
-                    <m:r>
-                      <a:rPr lang="en-US" b="0" i="1" smtClean="0">
-                        <a:latin typeface="Cambria Math" panose="02040503050406030204" pitchFamily="18" charset="0"/>
-                      </a:rPr>
-                      <m:t>𝑓</m:t>
-                    </m:r>
-                    <m:d>
-                      <m:dPr>
-                        <m:ctrlPr>
-                          <a:rPr lang="en-US" b="0" i="1" smtClean="0">
-                            <a:latin typeface="Cambria Math" panose="02040503050406030204" pitchFamily="18" charset="0"/>
-                          </a:rPr>
-                        </m:ctrlPr>
-                      </m:dPr>
-                      <m:e>
-                        <m:r>
-                          <a:rPr lang="en-US" b="0" i="1" smtClean="0">
-                            <a:latin typeface="Cambria Math" panose="02040503050406030204" pitchFamily="18" charset="0"/>
-                          </a:rPr>
-                          <m:t>𝑥</m:t>
-                        </m:r>
-                      </m:e>
-                    </m:d>
-                    <m:r>
-                      <a:rPr lang="en-US" b="0" i="1" smtClean="0">
-                        <a:latin typeface="Cambria Math" panose="02040503050406030204" pitchFamily="18" charset="0"/>
-                      </a:rPr>
-                      <m:t>= </m:t>
-                    </m:r>
-                    <m:sSup>
-                      <m:sSupPr>
-                        <m:ctrlPr>
-                          <a:rPr lang="en-US" b="0" i="1" smtClean="0">
-                            <a:latin typeface="Cambria Math" panose="02040503050406030204" pitchFamily="18" charset="0"/>
-                          </a:rPr>
-                        </m:ctrlPr>
-                      </m:sSupPr>
-                      <m:e>
-                        <m:r>
-                          <a:rPr lang="en-US" b="0" i="1" smtClean="0">
-                            <a:latin typeface="Cambria Math" panose="02040503050406030204" pitchFamily="18" charset="0"/>
-                          </a:rPr>
-                          <m:t>𝑥</m:t>
-                        </m:r>
-                      </m:e>
-                      <m:sup>
-                        <m:r>
-                          <a:rPr lang="en-US" b="0" i="1" smtClean="0">
-                            <a:latin typeface="Cambria Math" panose="02040503050406030204" pitchFamily="18" charset="0"/>
-                          </a:rPr>
-                          <m:t>2</m:t>
-                        </m:r>
-                      </m:sup>
-                    </m:sSup>
-                  </m:oMath>
-                </a14:m>
-                <a:endParaRPr lang="en-US" dirty="0"/>
-              </a:p>
-            </p:txBody>
-          </p:sp>
-        </mc:Choice>
-        <mc:Fallback xmlns="">
-          <p:sp>
-            <p:nvSpPr>
-              <p:cNvPr id="3" name="Content Placeholder 2"/>
-              <p:cNvSpPr>
-                <a:spLocks noGrp="1" noRot="1" noChangeAspect="1" noMove="1" noResize="1" noEditPoints="1" noAdjustHandles="1" noChangeArrowheads="1" noChangeShapeType="1" noTextEdit="1"/>
-              </p:cNvSpPr>
-              <p:nvPr>
-                <p:ph idx="1"/>
-              </p:nvPr>
-            </p:nvSpPr>
-            <p:spPr>
-              <a:blipFill rotWithShape="0">
-                <a:blip r:embed="rId2"/>
-                <a:stretch>
-                  <a:fillRect l="-1521"/>
-                </a:stretch>
-              </a:blipFill>
-            </p:spPr>
-            <p:txBody>
-              <a:bodyPr/>
-              <a:lstStyle/>
-              <a:p>
-                <a:r>
-                  <a:rPr lang="en-US">
-                    <a:noFill/>
-                  </a:rPr>
-                  <a:t> </a:t>
-                </a:r>
-              </a:p>
-            </p:txBody>
-          </p:sp>
-        </mc:Fallback>
-      </mc:AlternateContent>
-    </p:spTree>
-    <p:extLst>
-      <p:ext uri="{BB962C8B-B14F-4D97-AF65-F5344CB8AC3E}">
-        <p14:creationId xmlns:p14="http://schemas.microsoft.com/office/powerpoint/2010/main" val="1243588112"/>
-      </p:ext>
-    </p:extLst>
-  </p:cSld>
-  <p:clrMapOvr>
-    <a:masterClrMapping/>
-  </p:clrMapOvr>
-  <p:timing>
-    <p:tnLst>
-      <p:par>
-        <p:cTn id="1" dur="indefinite" restart="never" nodeType="tmRoot"/>
-      </p:par>
-    </p:tnLst>
-  </p:timing>
-</p:sld>
-</file>
-
-<file path=ppt/slides/slide30.xml><?xml version="1.0" encoding="utf-8"?>
+<file path=ppt/slides/slide27.xml><?xml version="1.0" encoding="utf-8"?>
 <p:sld xmlns:a="http://schemas.openxmlformats.org/drawingml/2006/main" xmlns:r="http://schemas.openxmlformats.org/officeDocument/2006/relationships" xmlns:p="http://schemas.openxmlformats.org/presentationml/2006/main">
   <p:cSld>
     <p:spTree>
@@ -13326,7 +12498,7 @@
 </p:sld>
 </file>
 
-<file path=ppt/slides/slide31.xml><?xml version="1.0" encoding="utf-8"?>
+<file path=ppt/slides/slide28.xml><?xml version="1.0" encoding="utf-8"?>
 <p:sld xmlns:a="http://schemas.openxmlformats.org/drawingml/2006/main" xmlns:r="http://schemas.openxmlformats.org/officeDocument/2006/relationships" xmlns:p="http://schemas.openxmlformats.org/presentationml/2006/main">
   <p:cSld>
     <p:spTree>
@@ -13444,6 +12616,199 @@
     <p:extLst>
       <p:ext uri="{BB962C8B-B14F-4D97-AF65-F5344CB8AC3E}">
         <p14:creationId xmlns:p14="http://schemas.microsoft.com/office/powerpoint/2010/main" val="4139561062"/>
+      </p:ext>
+    </p:extLst>
+  </p:cSld>
+  <p:clrMapOvr>
+    <a:masterClrMapping/>
+  </p:clrMapOvr>
+  <p:timing>
+    <p:tnLst>
+      <p:par>
+        <p:cTn id="1" dur="indefinite" restart="never" nodeType="tmRoot"/>
+      </p:par>
+    </p:tnLst>
+  </p:timing>
+</p:sld>
+</file>
+
+<file path=ppt/slides/slide3.xml><?xml version="1.0" encoding="utf-8"?>
+<p:sld xmlns:a="http://schemas.openxmlformats.org/drawingml/2006/main" xmlns:r="http://schemas.openxmlformats.org/officeDocument/2006/relationships" xmlns:p="http://schemas.openxmlformats.org/presentationml/2006/main">
+  <p:cSld>
+    <p:spTree>
+      <p:nvGrpSpPr>
+        <p:cNvPr id="1" name=""/>
+        <p:cNvGrpSpPr/>
+        <p:nvPr/>
+      </p:nvGrpSpPr>
+      <p:grpSpPr>
+        <a:xfrm>
+          <a:off x="0" y="0"/>
+          <a:ext cx="0" cy="0"/>
+          <a:chOff x="0" y="0"/>
+          <a:chExt cx="0" cy="0"/>
+        </a:xfrm>
+      </p:grpSpPr>
+      <p:sp>
+        <p:nvSpPr>
+          <p:cNvPr id="2" name="Title 1"/>
+          <p:cNvSpPr>
+            <a:spLocks noGrp="1"/>
+          </p:cNvSpPr>
+          <p:nvPr>
+            <p:ph type="title"/>
+          </p:nvPr>
+        </p:nvSpPr>
+        <p:spPr/>
+        <p:txBody>
+          <a:bodyPr/>
+          <a:lstStyle/>
+          <a:p>
+            <a:r>
+              <a:rPr lang="en-US" dirty="0" smtClean="0"/>
+              <a:t>Functional Programming</a:t>
+            </a:r>
+            <a:endParaRPr lang="en-US" dirty="0"/>
+          </a:p>
+        </p:txBody>
+      </p:sp>
+      <mc:AlternateContent xmlns:mc="http://schemas.openxmlformats.org/markup-compatibility/2006" xmlns:a14="http://schemas.microsoft.com/office/drawing/2010/main">
+        <mc:Choice Requires="a14">
+          <p:sp>
+            <p:nvSpPr>
+              <p:cNvPr id="3" name="Content Placeholder 2"/>
+              <p:cNvSpPr>
+                <a:spLocks noGrp="1"/>
+              </p:cNvSpPr>
+              <p:nvPr>
+                <p:ph idx="1"/>
+              </p:nvPr>
+            </p:nvSpPr>
+            <p:spPr/>
+            <p:txBody>
+              <a:bodyPr/>
+              <a:lstStyle/>
+              <a:p>
+                <a:r>
+                  <a:rPr lang="en-US" dirty="0" smtClean="0"/>
+                  <a:t>Another Programming paradigm (OOP, procedural, etc.)</a:t>
+                </a:r>
+              </a:p>
+              <a:p>
+                <a:r>
+                  <a:rPr lang="en-US" dirty="0" smtClean="0"/>
+                  <a:t>Centered around the mathematical concept of a function</a:t>
+                </a:r>
+              </a:p>
+              <a:p>
+                <a:pPr lvl="1"/>
+                <a:r>
+                  <a:rPr lang="en-US" dirty="0" smtClean="0"/>
+                  <a:t>Immutable and idempotent</a:t>
+                </a:r>
+              </a:p>
+              <a:p>
+                <a14:m>
+                  <m:oMath xmlns:m="http://schemas.openxmlformats.org/officeDocument/2006/math">
+                    <m:r>
+                      <a:rPr lang="en-US" b="0" i="1" smtClean="0">
+                        <a:latin typeface="Cambria Math" panose="02040503050406030204" pitchFamily="18" charset="0"/>
+                      </a:rPr>
+                      <m:t>𝑓</m:t>
+                    </m:r>
+                    <m:d>
+                      <m:dPr>
+                        <m:ctrlPr>
+                          <a:rPr lang="en-US" b="0" i="1" smtClean="0">
+                            <a:latin typeface="Cambria Math" panose="02040503050406030204" pitchFamily="18" charset="0"/>
+                          </a:rPr>
+                        </m:ctrlPr>
+                      </m:dPr>
+                      <m:e>
+                        <m:r>
+                          <a:rPr lang="en-US" b="0" i="1" smtClean="0">
+                            <a:latin typeface="Cambria Math" panose="02040503050406030204" pitchFamily="18" charset="0"/>
+                          </a:rPr>
+                          <m:t>𝑥</m:t>
+                        </m:r>
+                      </m:e>
+                    </m:d>
+                    <m:r>
+                      <a:rPr lang="en-US" b="0" i="1" smtClean="0">
+                        <a:latin typeface="Cambria Math" panose="02040503050406030204" pitchFamily="18" charset="0"/>
+                      </a:rPr>
+                      <m:t>= </m:t>
+                    </m:r>
+                    <m:sSup>
+                      <m:sSupPr>
+                        <m:ctrlPr>
+                          <a:rPr lang="en-US" b="0" i="1" smtClean="0">
+                            <a:latin typeface="Cambria Math" panose="02040503050406030204" pitchFamily="18" charset="0"/>
+                          </a:rPr>
+                        </m:ctrlPr>
+                      </m:sSupPr>
+                      <m:e>
+                        <m:r>
+                          <a:rPr lang="en-US" b="0" i="1" smtClean="0">
+                            <a:latin typeface="Cambria Math" panose="02040503050406030204" pitchFamily="18" charset="0"/>
+                          </a:rPr>
+                          <m:t>𝑥</m:t>
+                        </m:r>
+                      </m:e>
+                      <m:sup>
+                        <m:r>
+                          <a:rPr lang="en-US" b="0" i="1" smtClean="0">
+                            <a:latin typeface="Cambria Math" panose="02040503050406030204" pitchFamily="18" charset="0"/>
+                          </a:rPr>
+                          <m:t>2</m:t>
+                        </m:r>
+                      </m:sup>
+                    </m:sSup>
+                  </m:oMath>
+                </a14:m>
+                <a:endParaRPr lang="en-US" dirty="0"/>
+              </a:p>
+            </p:txBody>
+          </p:sp>
+        </mc:Choice>
+        <mc:Fallback xmlns="">
+          <p:sp>
+            <p:nvSpPr>
+              <p:cNvPr id="3" name="Content Placeholder 2"/>
+              <p:cNvSpPr>
+                <a:spLocks noGrp="1" noRot="1" noChangeAspect="1" noMove="1" noResize="1" noEditPoints="1" noAdjustHandles="1" noChangeArrowheads="1" noChangeShapeType="1" noTextEdit="1"/>
+              </p:cNvSpPr>
+              <p:nvPr>
+                <p:ph idx="1"/>
+              </p:nvPr>
+            </p:nvSpPr>
+            <p:spPr>
+              <a:blipFill rotWithShape="0">
+                <a:blip r:embed="rId2"/>
+                <a:stretch>
+                  <a:fillRect l="-1521"/>
+                </a:stretch>
+              </a:blipFill>
+            </p:spPr>
+            <p:txBody>
+              <a:bodyPr/>
+              <a:lstStyle/>
+              <a:p>
+                <a:r>
+                  <a:rPr lang="en-US">
+                    <a:noFill/>
+                  </a:rPr>
+                  <a:t> </a:t>
+                </a:r>
+              </a:p>
+            </p:txBody>
+          </p:sp>
+        </mc:Fallback>
+      </mc:AlternateContent>
+    </p:spTree>
+    <p:extLst>
+      <p:ext uri="{BB962C8B-B14F-4D97-AF65-F5344CB8AC3E}">
+        <p14:creationId xmlns:p14="http://schemas.microsoft.com/office/powerpoint/2010/main" val="1243588112"/>
       </p:ext>
     </p:extLst>
   </p:cSld>

</xml_diff>

<commit_message>
updated for CodeStock (July 2015)
</commit_message>
<xml_diff>
--- a/The Secrets of LINQ.pptx
+++ b/The Secrets of LINQ.pptx
@@ -224,7 +224,7 @@
           <a:p>
             <a:fld id="{2B45B597-923B-4730-A722-02F657477DB7}" type="datetimeFigureOut">
               <a:rPr lang="en-US" smtClean="0"/>
-              <a:t>3/21/2015</a:t>
+              <a:t>7/11/2015</a:t>
             </a:fld>
             <a:endParaRPr lang="en-US"/>
           </a:p>
@@ -1370,7 +1370,7 @@
           <a:p>
             <a:fld id="{8ECED3F7-F610-466C-BDF4-3183BAA439F6}" type="datetimeFigureOut">
               <a:rPr lang="en-US" smtClean="0"/>
-              <a:t>3/21/2015</a:t>
+              <a:t>7/11/2015</a:t>
             </a:fld>
             <a:endParaRPr lang="en-US"/>
           </a:p>
@@ -1666,7 +1666,7 @@
           <a:p>
             <a:fld id="{8ECED3F7-F610-466C-BDF4-3183BAA439F6}" type="datetimeFigureOut">
               <a:rPr lang="en-US" smtClean="0"/>
-              <a:t>3/21/2015</a:t>
+              <a:t>7/11/2015</a:t>
             </a:fld>
             <a:endParaRPr lang="en-US"/>
           </a:p>
@@ -1914,7 +1914,7 @@
           <a:p>
             <a:fld id="{8ECED3F7-F610-466C-BDF4-3183BAA439F6}" type="datetimeFigureOut">
               <a:rPr lang="en-US" smtClean="0"/>
-              <a:t>3/21/2015</a:t>
+              <a:t>7/11/2015</a:t>
             </a:fld>
             <a:endParaRPr lang="en-US"/>
           </a:p>
@@ -2454,7 +2454,7 @@
           <a:p>
             <a:fld id="{8ECED3F7-F610-466C-BDF4-3183BAA439F6}" type="datetimeFigureOut">
               <a:rPr lang="en-US" smtClean="0"/>
-              <a:t>3/21/2015</a:t>
+              <a:t>7/11/2015</a:t>
             </a:fld>
             <a:endParaRPr lang="en-US"/>
           </a:p>
@@ -2702,7 +2702,7 @@
           <a:p>
             <a:fld id="{8ECED3F7-F610-466C-BDF4-3183BAA439F6}" type="datetimeFigureOut">
               <a:rPr lang="en-US" smtClean="0"/>
-              <a:t>3/21/2015</a:t>
+              <a:t>7/11/2015</a:t>
             </a:fld>
             <a:endParaRPr lang="en-US"/>
           </a:p>
@@ -3234,7 +3234,7 @@
           <a:p>
             <a:fld id="{8ECED3F7-F610-466C-BDF4-3183BAA439F6}" type="datetimeFigureOut">
               <a:rPr lang="en-US" smtClean="0"/>
-              <a:t>3/21/2015</a:t>
+              <a:t>7/11/2015</a:t>
             </a:fld>
             <a:endParaRPr lang="en-US"/>
           </a:p>
@@ -3531,7 +3531,7 @@
           <a:p>
             <a:fld id="{8ECED3F7-F610-466C-BDF4-3183BAA439F6}" type="datetimeFigureOut">
               <a:rPr lang="en-US" smtClean="0"/>
-              <a:t>3/21/2015</a:t>
+              <a:t>7/11/2015</a:t>
             </a:fld>
             <a:endParaRPr lang="en-US"/>
           </a:p>
@@ -3705,7 +3705,7 @@
           <a:p>
             <a:fld id="{8ECED3F7-F610-466C-BDF4-3183BAA439F6}" type="datetimeFigureOut">
               <a:rPr lang="en-US" smtClean="0"/>
-              <a:t>3/21/2015</a:t>
+              <a:t>7/11/2015</a:t>
             </a:fld>
             <a:endParaRPr lang="en-US"/>
           </a:p>
@@ -3885,7 +3885,7 @@
           <a:p>
             <a:fld id="{8ECED3F7-F610-466C-BDF4-3183BAA439F6}" type="datetimeFigureOut">
               <a:rPr lang="en-US" smtClean="0"/>
-              <a:t>3/21/2015</a:t>
+              <a:t>7/11/2015</a:t>
             </a:fld>
             <a:endParaRPr lang="en-US"/>
           </a:p>
@@ -4055,7 +4055,7 @@
           <a:p>
             <a:fld id="{8ECED3F7-F610-466C-BDF4-3183BAA439F6}" type="datetimeFigureOut">
               <a:rPr lang="en-US" smtClean="0"/>
-              <a:t>3/21/2015</a:t>
+              <a:t>7/11/2015</a:t>
             </a:fld>
             <a:endParaRPr lang="en-US"/>
           </a:p>
@@ -4306,7 +4306,7 @@
           <a:p>
             <a:fld id="{8ECED3F7-F610-466C-BDF4-3183BAA439F6}" type="datetimeFigureOut">
               <a:rPr lang="en-US" smtClean="0"/>
-              <a:t>3/21/2015</a:t>
+              <a:t>7/11/2015</a:t>
             </a:fld>
             <a:endParaRPr lang="en-US"/>
           </a:p>
@@ -4603,7 +4603,7 @@
           <a:p>
             <a:fld id="{8ECED3F7-F610-466C-BDF4-3183BAA439F6}" type="datetimeFigureOut">
               <a:rPr lang="en-US" smtClean="0"/>
-              <a:t>3/21/2015</a:t>
+              <a:t>7/11/2015</a:t>
             </a:fld>
             <a:endParaRPr lang="en-US"/>
           </a:p>
@@ -5045,7 +5045,7 @@
           <a:p>
             <a:fld id="{8ECED3F7-F610-466C-BDF4-3183BAA439F6}" type="datetimeFigureOut">
               <a:rPr lang="en-US" smtClean="0"/>
-              <a:t>3/21/2015</a:t>
+              <a:t>7/11/2015</a:t>
             </a:fld>
             <a:endParaRPr lang="en-US"/>
           </a:p>
@@ -5163,7 +5163,7 @@
           <a:p>
             <a:fld id="{8ECED3F7-F610-466C-BDF4-3183BAA439F6}" type="datetimeFigureOut">
               <a:rPr lang="en-US" smtClean="0"/>
-              <a:t>3/21/2015</a:t>
+              <a:t>7/11/2015</a:t>
             </a:fld>
             <a:endParaRPr lang="en-US"/>
           </a:p>
@@ -5258,7 +5258,7 @@
           <a:p>
             <a:fld id="{8ECED3F7-F610-466C-BDF4-3183BAA439F6}" type="datetimeFigureOut">
               <a:rPr lang="en-US" smtClean="0"/>
-              <a:t>3/21/2015</a:t>
+              <a:t>7/11/2015</a:t>
             </a:fld>
             <a:endParaRPr lang="en-US"/>
           </a:p>
@@ -5541,7 +5541,7 @@
           <a:p>
             <a:fld id="{8ECED3F7-F610-466C-BDF4-3183BAA439F6}" type="datetimeFigureOut">
               <a:rPr lang="en-US" smtClean="0"/>
-              <a:t>3/21/2015</a:t>
+              <a:t>7/11/2015</a:t>
             </a:fld>
             <a:endParaRPr lang="en-US"/>
           </a:p>
@@ -5832,7 +5832,7 @@
           <a:p>
             <a:fld id="{8ECED3F7-F610-466C-BDF4-3183BAA439F6}" type="datetimeFigureOut">
               <a:rPr lang="en-US" smtClean="0"/>
-              <a:t>3/21/2015</a:t>
+              <a:t>7/11/2015</a:t>
             </a:fld>
             <a:endParaRPr lang="en-US"/>
           </a:p>
@@ -6362,7 +6362,7 @@
           <a:p>
             <a:fld id="{8ECED3F7-F610-466C-BDF4-3183BAA439F6}" type="datetimeFigureOut">
               <a:rPr lang="en-US" smtClean="0"/>
-              <a:t>3/21/2015</a:t>
+              <a:t>7/11/2015</a:t>
             </a:fld>
             <a:endParaRPr lang="en-US"/>
           </a:p>
@@ -9260,20 +9260,36 @@
               <a:buNone/>
             </a:pPr>
             <a:r>
+              <a:rPr lang="en-US" dirty="0" err="1" smtClean="0">
+                <a:solidFill>
+                  <a:srgbClr val="2B91B1"/>
+                </a:solidFill>
+              </a:rPr>
+              <a:t>Func</a:t>
+            </a:r>
+            <a:r>
+              <a:rPr lang="en-US" dirty="0" smtClean="0"/>
+              <a:t>&lt;</a:t>
+            </a:r>
+            <a:r>
               <a:rPr lang="en-US" dirty="0" smtClean="0">
                 <a:solidFill>
                   <a:srgbClr val="0000FF"/>
                 </a:solidFill>
               </a:rPr>
-              <a:t>public double </a:t>
+              <a:t>double</a:t>
+            </a:r>
+            <a:r>
+              <a:rPr lang="en-US" dirty="0" smtClean="0"/>
+              <a:t>&gt; </a:t>
             </a:r>
             <a:r>
               <a:rPr lang="en-US" dirty="0" err="1" smtClean="0"/>
-              <a:t>GetPi</a:t>
+              <a:t>piFunc</a:t>
             </a:r>
             <a:r>
               <a:rPr lang="en-US" dirty="0" smtClean="0"/>
-              <a:t>() { return </a:t>
+              <a:t> = () =&gt; </a:t>
             </a:r>
             <a:r>
               <a:rPr lang="en-US" dirty="0" err="1" smtClean="0">
@@ -9288,54 +9304,10 @@
               <a:t>.PI</a:t>
             </a:r>
             <a:r>
-              <a:rPr lang="en-US" dirty="0" smtClean="0"/>
-              <a:t>; }</a:t>
-            </a:r>
-          </a:p>
-          <a:p>
-            <a:pPr marL="457200" lvl="1" indent="0">
-              <a:buNone/>
-            </a:pPr>
-            <a:r>
-              <a:rPr lang="en-US" dirty="0" err="1" smtClean="0">
-                <a:solidFill>
-                  <a:srgbClr val="2B91B1"/>
-                </a:solidFill>
-              </a:rPr>
-              <a:t>Func</a:t>
-            </a:r>
-            <a:r>
-              <a:rPr lang="en-US" dirty="0" smtClean="0"/>
-              <a:t>&lt;</a:t>
-            </a:r>
-            <a:r>
-              <a:rPr lang="en-US" dirty="0" smtClean="0">
-                <a:solidFill>
-                  <a:srgbClr val="0000FF"/>
-                </a:solidFill>
-              </a:rPr>
-              <a:t>double</a:t>
-            </a:r>
-            <a:r>
-              <a:rPr lang="en-US" dirty="0" smtClean="0"/>
-              <a:t>&gt; </a:t>
-            </a:r>
-            <a:r>
-              <a:rPr lang="en-US" dirty="0" err="1" smtClean="0"/>
-              <a:t>piFunc</a:t>
-            </a:r>
-            <a:r>
-              <a:rPr lang="en-US" dirty="0" smtClean="0"/>
-              <a:t> = () =&gt; </a:t>
-            </a:r>
-            <a:r>
-              <a:rPr lang="en-US" dirty="0" err="1" smtClean="0"/>
-              <a:t>GetPi</a:t>
-            </a:r>
-            <a:r>
-              <a:rPr lang="en-US" dirty="0" smtClean="0"/>
-              <a:t>();</a:t>
-            </a:r>
+              <a:rPr lang="en-US" dirty="0"/>
+              <a:t>;</a:t>
+            </a:r>
+            <a:endParaRPr lang="en-US" dirty="0" smtClean="0"/>
           </a:p>
           <a:p>
             <a:r>
@@ -9553,15 +9525,33 @@
                                   </p:childTnLst>
                                 </p:cTn>
                               </p:par>
+                            </p:childTnLst>
+                          </p:cTn>
+                        </p:par>
+                      </p:childTnLst>
+                    </p:cTn>
+                  </p:par>
+                  <p:par>
+                    <p:cTn id="11" fill="hold">
+                      <p:stCondLst>
+                        <p:cond delay="indefinite"/>
+                      </p:stCondLst>
+                      <p:childTnLst>
+                        <p:par>
+                          <p:cTn id="12" fill="hold">
+                            <p:stCondLst>
+                              <p:cond delay="0"/>
+                            </p:stCondLst>
+                            <p:childTnLst>
                               <p:par>
-                                <p:cTn id="11" presetID="1" presetClass="entr" presetSubtype="0" fill="hold" nodeType="withEffect">
+                                <p:cTn id="13" presetID="1" presetClass="entr" presetSubtype="0" fill="hold" nodeType="clickEffect">
                                   <p:stCondLst>
                                     <p:cond delay="0"/>
                                   </p:stCondLst>
                                   <p:childTnLst>
                                     <p:set>
                                       <p:cBhvr>
-                                        <p:cTn id="12" dur="1" fill="hold">
+                                        <p:cTn id="14" dur="1" fill="hold">
                                           <p:stCondLst>
                                             <p:cond delay="0"/>
                                           </p:stCondLst>
@@ -9584,26 +9574,8 @@
                                   </p:childTnLst>
                                 </p:cTn>
                               </p:par>
-                            </p:childTnLst>
-                          </p:cTn>
-                        </p:par>
-                      </p:childTnLst>
-                    </p:cTn>
-                  </p:par>
-                  <p:par>
-                    <p:cTn id="13" fill="hold">
-                      <p:stCondLst>
-                        <p:cond delay="indefinite"/>
-                      </p:stCondLst>
-                      <p:childTnLst>
-                        <p:par>
-                          <p:cTn id="14" fill="hold">
-                            <p:stCondLst>
-                              <p:cond delay="0"/>
-                            </p:stCondLst>
-                            <p:childTnLst>
                               <p:par>
-                                <p:cTn id="15" presetID="1" presetClass="entr" presetSubtype="0" fill="hold" nodeType="clickEffect">
+                                <p:cTn id="15" presetID="1" presetClass="entr" presetSubtype="0" fill="hold" nodeType="withEffect">
                                   <p:stCondLst>
                                     <p:cond delay="0"/>
                                   </p:stCondLst>
@@ -9664,37 +9636,6 @@
                                   </p:childTnLst>
                                 </p:cTn>
                               </p:par>
-                              <p:par>
-                                <p:cTn id="19" presetID="1" presetClass="entr" presetSubtype="0" fill="hold" nodeType="withEffect">
-                                  <p:stCondLst>
-                                    <p:cond delay="0"/>
-                                  </p:stCondLst>
-                                  <p:childTnLst>
-                                    <p:set>
-                                      <p:cBhvr>
-                                        <p:cTn id="20" dur="1" fill="hold">
-                                          <p:stCondLst>
-                                            <p:cond delay="0"/>
-                                          </p:stCondLst>
-                                        </p:cTn>
-                                        <p:tgtEl>
-                                          <p:spTgt spid="3">
-                                            <p:txEl>
-                                              <p:pRg st="6" end="6"/>
-                                            </p:txEl>
-                                          </p:spTgt>
-                                        </p:tgtEl>
-                                        <p:attrNameLst>
-                                          <p:attrName>style.visibility</p:attrName>
-                                        </p:attrNameLst>
-                                      </p:cBhvr>
-                                      <p:to>
-                                        <p:strVal val="visible"/>
-                                      </p:to>
-                                    </p:set>
-                                  </p:childTnLst>
-                                </p:cTn>
-                              </p:par>
                             </p:childTnLst>
                           </p:cTn>
                         </p:par>
@@ -9702,26 +9643,26 @@
                     </p:cTn>
                   </p:par>
                   <p:par>
-                    <p:cTn id="21" fill="hold">
+                    <p:cTn id="19" fill="hold">
                       <p:stCondLst>
                         <p:cond delay="indefinite"/>
                       </p:stCondLst>
                       <p:childTnLst>
                         <p:par>
-                          <p:cTn id="22" fill="hold">
+                          <p:cTn id="20" fill="hold">
                             <p:stCondLst>
                               <p:cond delay="0"/>
                             </p:stCondLst>
                             <p:childTnLst>
                               <p:par>
-                                <p:cTn id="23" presetID="1" presetClass="entr" presetSubtype="0" fill="hold" nodeType="clickEffect">
+                                <p:cTn id="21" presetID="1" presetClass="entr" presetSubtype="0" fill="hold" nodeType="clickEffect">
                                   <p:stCondLst>
                                     <p:cond delay="0"/>
                                   </p:stCondLst>
                                   <p:childTnLst>
                                     <p:set>
                                       <p:cBhvr>
-                                        <p:cTn id="24" dur="1" fill="hold">
+                                        <p:cTn id="22" dur="1" fill="hold">
                                           <p:stCondLst>
                                             <p:cond delay="0"/>
                                           </p:stCondLst>
@@ -9745,14 +9686,14 @@
                                 </p:cTn>
                               </p:par>
                               <p:par>
-                                <p:cTn id="25" presetID="1" presetClass="entr" presetSubtype="0" fill="hold" nodeType="withEffect">
+                                <p:cTn id="23" presetID="1" presetClass="entr" presetSubtype="0" fill="hold" nodeType="withEffect">
                                   <p:stCondLst>
                                     <p:cond delay="0"/>
                                   </p:stCondLst>
                                   <p:childTnLst>
                                     <p:set>
                                       <p:cBhvr>
-                                        <p:cTn id="26" dur="1" fill="hold">
+                                        <p:cTn id="24" dur="1" fill="hold">
                                           <p:stCondLst>
                                             <p:cond delay="0"/>
                                           </p:stCondLst>
@@ -9776,14 +9717,14 @@
                                 </p:cTn>
                               </p:par>
                               <p:par>
-                                <p:cTn id="27" presetID="1" presetClass="entr" presetSubtype="0" fill="hold" nodeType="withEffect">
+                                <p:cTn id="25" presetID="1" presetClass="entr" presetSubtype="0" fill="hold" nodeType="withEffect">
                                   <p:stCondLst>
                                     <p:cond delay="0"/>
                                   </p:stCondLst>
                                   <p:childTnLst>
                                     <p:set>
                                       <p:cBhvr>
-                                        <p:cTn id="28" dur="1" fill="hold">
+                                        <p:cTn id="26" dur="1" fill="hold">
                                           <p:stCondLst>
                                             <p:cond delay="0"/>
                                           </p:stCondLst>

</xml_diff>